<commit_message>
add general doc workflow
</commit_message>
<xml_diff>
--- a/docs/images/sash_workflow_overview_diagram_Vqc.pptx
+++ b/docs/images/sash_workflow_overview_diagram_Vqc.pptx
@@ -113,14 +113,6 @@
     </p:ext>
   </p:extLst>
 </p:presentation>
-</file>
-
-<file path=ppt/revisionInfo.xml><?xml version="1.0" encoding="utf-8"?>
-<p1510:revInfo xmlns:a="http://schemas.openxmlformats.org/drawingml/2006/main" xmlns:r="http://schemas.openxmlformats.org/officeDocument/2006/relationships" xmlns:p1510="http://schemas.microsoft.com/office/powerpoint/2015/10/main">
-  <p1510:revLst>
-    <p1510:client id="{03924DA2-B150-D246-839B-030D6976F11A}" v="8" dt="2025-03-12T23:19:55.239"/>
-  </p1510:revLst>
-</p1510:revInfo>
 </file>
 
 <file path=ppt/notesMasters/notesMaster1.xml><?xml version="1.0" encoding="utf-8"?>
@@ -7873,18 +7865,17 @@
             <p:cNvCxnSpPr>
               <a:cxnSpLocks/>
               <a:stCxn id="14" idx="3"/>
-              <a:endCxn id="246" idx="1"/>
             </p:cNvCxnSpPr>
             <p:nvPr/>
           </p:nvCxnSpPr>
           <p:spPr>
             <a:xfrm>
               <a:off x="8484321" y="2310538"/>
-              <a:ext cx="1792935" cy="1450339"/>
+              <a:ext cx="1810241" cy="1292249"/>
             </a:xfrm>
             <a:prstGeom prst="bentConnector3">
               <a:avLst>
-                <a:gd name="adj1" fmla="val 76165"/>
+                <a:gd name="adj1" fmla="val 72841"/>
               </a:avLst>
             </a:prstGeom>
             <a:ln>
@@ -7894,7 +7885,7 @@
                   <a:lumOff val="15000"/>
                 </a:schemeClr>
               </a:solidFill>
-              <a:tailEnd type="none"/>
+              <a:tailEnd type="triangle"/>
             </a:ln>
           </p:spPr>
           <p:style>

</xml_diff>